<commit_message>
additional changes workshop document
</commit_message>
<xml_diff>
--- a/week_03/slides/rbp_workshop_03.pptx
+++ b/week_03/slides/rbp_workshop_03.pptx
@@ -5,7 +5,7 @@
     <p:sldMasterId id="2147483648" r:id="rId1"/>
   </p:sldMasterIdLst>
   <p:notesMasterIdLst>
-    <p:notesMasterId r:id="rId11"/>
+    <p:notesMasterId r:id="rId12"/>
   </p:notesMasterIdLst>
   <p:sldIdLst>
     <p:sldId id="1778" r:id="rId2"/>
@@ -15,8 +15,9 @@
     <p:sldId id="1790" r:id="rId6"/>
     <p:sldId id="1796" r:id="rId7"/>
     <p:sldId id="1791" r:id="rId8"/>
-    <p:sldId id="1793" r:id="rId9"/>
-    <p:sldId id="1738" r:id="rId10"/>
+    <p:sldId id="1797" r:id="rId9"/>
+    <p:sldId id="1793" r:id="rId10"/>
+    <p:sldId id="1738" r:id="rId11"/>
   </p:sldIdLst>
   <p:sldSz cx="12192000" cy="6858000"/>
   <p:notesSz cx="6858000" cy="9144000"/>
@@ -30968,6 +30969,120 @@
     <p:extLst>
       <p:ext uri="{BB962C8B-B14F-4D97-AF65-F5344CB8AC3E}">
         <p14:creationId xmlns:p14="http://schemas.microsoft.com/office/powerpoint/2010/main" val="2360416611"/>
+      </p:ext>
+    </p:extLst>
+  </p:cSld>
+  <p:clrMapOvr>
+    <a:masterClrMapping/>
+  </p:clrMapOvr>
+</p:notes>
+</file>
+
+<file path=ppt/notesSlides/notesSlide10.xml><?xml version="1.0" encoding="utf-8"?>
+<p:notes xmlns:a="http://schemas.openxmlformats.org/drawingml/2006/main" xmlns:r="http://schemas.openxmlformats.org/officeDocument/2006/relationships" xmlns:p="http://schemas.openxmlformats.org/presentationml/2006/main">
+  <p:cSld>
+    <p:spTree>
+      <p:nvGrpSpPr>
+        <p:cNvPr id="1" name=""/>
+        <p:cNvGrpSpPr/>
+        <p:nvPr/>
+      </p:nvGrpSpPr>
+      <p:grpSpPr>
+        <a:xfrm>
+          <a:off x="0" y="0"/>
+          <a:ext cx="0" cy="0"/>
+          <a:chOff x="0" y="0"/>
+          <a:chExt cx="0" cy="0"/>
+        </a:xfrm>
+      </p:grpSpPr>
+      <p:sp>
+        <p:nvSpPr>
+          <p:cNvPr id="2" name="Slide Image Placeholder 1"/>
+          <p:cNvSpPr>
+            <a:spLocks noGrp="1" noRot="1" noChangeAspect="1"/>
+          </p:cNvSpPr>
+          <p:nvPr>
+            <p:ph type="sldImg"/>
+          </p:nvPr>
+        </p:nvSpPr>
+        <p:spPr>
+          <a:xfrm>
+            <a:off x="381000" y="685800"/>
+            <a:ext cx="6096000" cy="3429000"/>
+          </a:xfrm>
+        </p:spPr>
+      </p:sp>
+      <p:sp>
+        <p:nvSpPr>
+          <p:cNvPr id="3" name="Notes Placeholder 2"/>
+          <p:cNvSpPr>
+            <a:spLocks noGrp="1"/>
+          </p:cNvSpPr>
+          <p:nvPr>
+            <p:ph type="body" idx="1"/>
+          </p:nvPr>
+        </p:nvSpPr>
+        <p:spPr/>
+        <p:txBody>
+          <a:bodyPr/>
+          <a:lstStyle/>
+          <a:p>
+            <a:pPr marL="0" marR="0" lvl="0" indent="0" algn="l" defTabSz="914400" rtl="0" eaLnBrk="1" fontAlgn="auto" latinLnBrk="0" hangingPunct="1">
+              <a:lnSpc>
+                <a:spcPct val="100000"/>
+              </a:lnSpc>
+              <a:spcBef>
+                <a:spcPts val="0"/>
+              </a:spcBef>
+              <a:spcAft>
+                <a:spcPts val="0"/>
+              </a:spcAft>
+              <a:buClrTx/>
+              <a:buSzTx/>
+              <a:buFontTx/>
+              <a:buNone/>
+              <a:tabLst/>
+              <a:defRPr/>
+            </a:pPr>
+            <a:endParaRPr lang="en-US" dirty="0">
+              <a:solidFill>
+                <a:srgbClr val="17161C"/>
+              </a:solidFill>
+              <a:latin typeface="Avenir Next" panose="020B0503020202020204" pitchFamily="34" charset="0"/>
+              <a:ea typeface="Nunito"/>
+              <a:cs typeface="Nunito"/>
+              <a:sym typeface="Nunito"/>
+            </a:endParaRPr>
+          </a:p>
+        </p:txBody>
+      </p:sp>
+      <p:sp>
+        <p:nvSpPr>
+          <p:cNvPr id="4" name="Slide Number Placeholder 3"/>
+          <p:cNvSpPr>
+            <a:spLocks noGrp="1"/>
+          </p:cNvSpPr>
+          <p:nvPr>
+            <p:ph type="sldNum" sz="quarter" idx="5"/>
+          </p:nvPr>
+        </p:nvSpPr>
+        <p:spPr/>
+        <p:txBody>
+          <a:bodyPr/>
+          <a:lstStyle/>
+          <a:p>
+            <a:fld id="{1526202F-DEF9-4191-8752-62497FCB2E3D}" type="slidenum">
+              <a:rPr lang="en-US" smtClean="0"/>
+              <a:t>10</a:t>
+            </a:fld>
+            <a:endParaRPr lang="en-US"/>
+          </a:p>
+        </p:txBody>
+      </p:sp>
+    </p:spTree>
+    <p:extLst>
+      <p:ext uri="{BB962C8B-B14F-4D97-AF65-F5344CB8AC3E}">
+        <p14:creationId xmlns:p14="http://schemas.microsoft.com/office/powerpoint/2010/main" val="819424315"/>
       </p:ext>
     </p:extLst>
   </p:cSld>
@@ -31760,7 +31875,7 @@
     </p:spTree>
     <p:extLst>
       <p:ext uri="{BB962C8B-B14F-4D97-AF65-F5344CB8AC3E}">
-        <p14:creationId xmlns:p14="http://schemas.microsoft.com/office/powerpoint/2010/main" val="440544890"/>
+        <p14:creationId xmlns:p14="http://schemas.microsoft.com/office/powerpoint/2010/main" val="2931355334"/>
       </p:ext>
     </p:extLst>
   </p:cSld>
@@ -31874,7 +31989,7 @@
     </p:spTree>
     <p:extLst>
       <p:ext uri="{BB962C8B-B14F-4D97-AF65-F5344CB8AC3E}">
-        <p14:creationId xmlns:p14="http://schemas.microsoft.com/office/powerpoint/2010/main" val="819424315"/>
+        <p14:creationId xmlns:p14="http://schemas.microsoft.com/office/powerpoint/2010/main" val="440544890"/>
       </p:ext>
     </p:extLst>
   </p:cSld>
@@ -33870,6 +33985,376 @@
 </p:sld>
 </file>
 
+<file path=ppt/slides/slide10.xml><?xml version="1.0" encoding="utf-8"?>
+<p:sld xmlns:a="http://schemas.openxmlformats.org/drawingml/2006/main" xmlns:r="http://schemas.openxmlformats.org/officeDocument/2006/relationships" xmlns:p="http://schemas.openxmlformats.org/presentationml/2006/main">
+  <p:cSld>
+    <p:spTree>
+      <p:nvGrpSpPr>
+        <p:cNvPr id="1" name=""/>
+        <p:cNvGrpSpPr/>
+        <p:nvPr/>
+      </p:nvGrpSpPr>
+      <p:grpSpPr>
+        <a:xfrm>
+          <a:off x="0" y="0"/>
+          <a:ext cx="0" cy="0"/>
+          <a:chOff x="0" y="0"/>
+          <a:chExt cx="0" cy="0"/>
+        </a:xfrm>
+      </p:grpSpPr>
+      <p:cxnSp>
+        <p:nvCxnSpPr>
+          <p:cNvPr id="43" name="Straight Connector 42">
+            <a:extLst>
+              <a:ext uri="{FF2B5EF4-FFF2-40B4-BE49-F238E27FC236}">
+                <a16:creationId xmlns:a16="http://schemas.microsoft.com/office/drawing/2014/main" id="{3A5077C6-7E4F-2F4E-BD92-B687C1BB85ED}"/>
+              </a:ext>
+            </a:extLst>
+          </p:cNvPr>
+          <p:cNvCxnSpPr>
+            <a:cxnSpLocks/>
+          </p:cNvCxnSpPr>
+          <p:nvPr/>
+        </p:nvCxnSpPr>
+        <p:spPr>
+          <a:xfrm>
+            <a:off x="479419" y="647537"/>
+            <a:ext cx="744431" cy="0"/>
+          </a:xfrm>
+          <a:prstGeom prst="line">
+            <a:avLst/>
+          </a:prstGeom>
+          <a:ln w="38100">
+            <a:solidFill>
+              <a:srgbClr val="57A7B1"/>
+            </a:solidFill>
+          </a:ln>
+        </p:spPr>
+        <p:style>
+          <a:lnRef idx="1">
+            <a:schemeClr val="accent1"/>
+          </a:lnRef>
+          <a:fillRef idx="0">
+            <a:schemeClr val="accent1"/>
+          </a:fillRef>
+          <a:effectRef idx="0">
+            <a:schemeClr val="accent1"/>
+          </a:effectRef>
+          <a:fontRef idx="minor">
+            <a:schemeClr val="tx1"/>
+          </a:fontRef>
+        </p:style>
+      </p:cxnSp>
+      <p:sp>
+        <p:nvSpPr>
+          <p:cNvPr id="44" name="TextBox 43">
+            <a:extLst>
+              <a:ext uri="{FF2B5EF4-FFF2-40B4-BE49-F238E27FC236}">
+                <a16:creationId xmlns:a16="http://schemas.microsoft.com/office/drawing/2014/main" id="{BFA7D6A8-F365-734B-A552-638838DBD786}"/>
+              </a:ext>
+            </a:extLst>
+          </p:cNvPr>
+          <p:cNvSpPr txBox="1"/>
+          <p:nvPr/>
+        </p:nvSpPr>
+        <p:spPr>
+          <a:xfrm>
+            <a:off x="355478" y="128981"/>
+            <a:ext cx="3781741" cy="523220"/>
+          </a:xfrm>
+          <a:prstGeom prst="rect">
+            <a:avLst/>
+          </a:prstGeom>
+          <a:noFill/>
+        </p:spPr>
+        <p:txBody>
+          <a:bodyPr wrap="none">
+            <a:spAutoFit/>
+          </a:bodyPr>
+          <a:lstStyle/>
+          <a:p>
+            <a:r>
+              <a:rPr lang="en-US" sz="2800" b="1" dirty="0">
+                <a:latin typeface="Avenir Next" panose="020B0503020202020204" pitchFamily="34" charset="0"/>
+              </a:rPr>
+              <a:t>Study hall reminders</a:t>
+            </a:r>
+          </a:p>
+        </p:txBody>
+      </p:sp>
+      <p:sp>
+        <p:nvSpPr>
+          <p:cNvPr id="4" name="TextBox 3">
+            <a:extLst>
+              <a:ext uri="{FF2B5EF4-FFF2-40B4-BE49-F238E27FC236}">
+                <a16:creationId xmlns:a16="http://schemas.microsoft.com/office/drawing/2014/main" id="{1745B0C2-3181-F6C6-FF23-F512941CE866}"/>
+              </a:ext>
+            </a:extLst>
+          </p:cNvPr>
+          <p:cNvSpPr txBox="1"/>
+          <p:nvPr/>
+        </p:nvSpPr>
+        <p:spPr>
+          <a:xfrm>
+            <a:off x="355477" y="816645"/>
+            <a:ext cx="11514400" cy="1877437"/>
+          </a:xfrm>
+          <a:prstGeom prst="rect">
+            <a:avLst/>
+          </a:prstGeom>
+          <a:noFill/>
+        </p:spPr>
+        <p:txBody>
+          <a:bodyPr wrap="square" rtlCol="0">
+            <a:spAutoFit/>
+          </a:bodyPr>
+          <a:lstStyle/>
+          <a:p>
+            <a:pPr marL="457189" indent="-457189">
+              <a:buFont typeface="Arial" panose="020B0604020202020204" pitchFamily="34" charset="0"/>
+              <a:buChar char="•"/>
+            </a:pPr>
+            <a:r>
+              <a:rPr lang="en-CH" sz="3200" dirty="0">
+                <a:latin typeface="Calibri" panose="020F0502020204030204" pitchFamily="34" charset="0"/>
+                <a:cs typeface="Calibri" panose="020F0502020204030204" pitchFamily="34" charset="0"/>
+              </a:rPr>
+              <a:t>Optional study hall sessions three times a week</a:t>
+            </a:r>
+            <a:endParaRPr lang="en-CH" sz="2800" dirty="0">
+              <a:latin typeface="Calibri" panose="020F0502020204030204" pitchFamily="34" charset="0"/>
+              <a:cs typeface="Calibri" panose="020F0502020204030204" pitchFamily="34" charset="0"/>
+            </a:endParaRPr>
+          </a:p>
+          <a:p>
+            <a:pPr marL="914389" lvl="1" indent="-457189">
+              <a:buFont typeface="Arial" panose="020B0604020202020204" pitchFamily="34" charset="0"/>
+              <a:buChar char="•"/>
+            </a:pPr>
+            <a:r>
+              <a:rPr lang="en-CH" sz="2800" dirty="0">
+                <a:latin typeface="Calibri" panose="020F0502020204030204" pitchFamily="34" charset="0"/>
+                <a:cs typeface="Calibri" panose="020F0502020204030204" pitchFamily="34" charset="0"/>
+              </a:rPr>
+              <a:t>Wednesday 3 to 5 pm UTC+2</a:t>
+            </a:r>
+          </a:p>
+          <a:p>
+            <a:pPr marL="914389" lvl="1" indent="-457189">
+              <a:buFont typeface="Arial" panose="020B0604020202020204" pitchFamily="34" charset="0"/>
+              <a:buChar char="•"/>
+            </a:pPr>
+            <a:r>
+              <a:rPr lang="en-CH" sz="2800" dirty="0">
+                <a:latin typeface="Calibri" panose="020F0502020204030204" pitchFamily="34" charset="0"/>
+                <a:cs typeface="Calibri" panose="020F0502020204030204" pitchFamily="34" charset="0"/>
+              </a:rPr>
+              <a:t>Thursday 6 to 8 pm UTC+2</a:t>
+            </a:r>
+          </a:p>
+          <a:p>
+            <a:pPr marL="914389" lvl="1" indent="-457189">
+              <a:buFont typeface="Arial" panose="020B0604020202020204" pitchFamily="34" charset="0"/>
+              <a:buChar char="•"/>
+            </a:pPr>
+            <a:r>
+              <a:rPr lang="en-CH" sz="2800" dirty="0">
+                <a:latin typeface="Calibri" panose="020F0502020204030204" pitchFamily="34" charset="0"/>
+                <a:cs typeface="Calibri" panose="020F0502020204030204" pitchFamily="34" charset="0"/>
+              </a:rPr>
+              <a:t>Sunday 5 to 7 pm UTC+2</a:t>
+            </a:r>
+          </a:p>
+        </p:txBody>
+      </p:sp>
+    </p:spTree>
+    <p:extLst>
+      <p:ext uri="{BB962C8B-B14F-4D97-AF65-F5344CB8AC3E}">
+        <p14:creationId xmlns:p14="http://schemas.microsoft.com/office/powerpoint/2010/main" val="3514718426"/>
+      </p:ext>
+    </p:extLst>
+  </p:cSld>
+  <p:clrMapOvr>
+    <a:masterClrMapping/>
+  </p:clrMapOvr>
+  <p:timing>
+    <p:tnLst>
+      <p:par>
+        <p:cTn id="1" dur="indefinite" restart="never" nodeType="tmRoot">
+          <p:childTnLst>
+            <p:seq concurrent="1" nextAc="seek">
+              <p:cTn id="2" dur="indefinite" nodeType="mainSeq">
+                <p:childTnLst>
+                  <p:par>
+                    <p:cTn id="3" fill="hold">
+                      <p:stCondLst>
+                        <p:cond delay="indefinite"/>
+                      </p:stCondLst>
+                      <p:childTnLst>
+                        <p:par>
+                          <p:cTn id="4" fill="hold">
+                            <p:stCondLst>
+                              <p:cond delay="0"/>
+                            </p:stCondLst>
+                            <p:childTnLst>
+                              <p:par>
+                                <p:cTn id="5" presetID="1" presetClass="entr" presetSubtype="0" fill="hold" grpId="0" nodeType="clickEffect">
+                                  <p:stCondLst>
+                                    <p:cond delay="0"/>
+                                  </p:stCondLst>
+                                  <p:childTnLst>
+                                    <p:set>
+                                      <p:cBhvr>
+                                        <p:cTn id="6" dur="1" fill="hold">
+                                          <p:stCondLst>
+                                            <p:cond delay="0"/>
+                                          </p:stCondLst>
+                                        </p:cTn>
+                                        <p:tgtEl>
+                                          <p:spTgt spid="4">
+                                            <p:txEl>
+                                              <p:pRg st="0" end="0"/>
+                                            </p:txEl>
+                                          </p:spTgt>
+                                        </p:tgtEl>
+                                        <p:attrNameLst>
+                                          <p:attrName>style.visibility</p:attrName>
+                                        </p:attrNameLst>
+                                      </p:cBhvr>
+                                      <p:to>
+                                        <p:strVal val="visible"/>
+                                      </p:to>
+                                    </p:set>
+                                  </p:childTnLst>
+                                </p:cTn>
+                              </p:par>
+                              <p:par>
+                                <p:cTn id="7" presetID="1" presetClass="entr" presetSubtype="0" fill="hold" grpId="0" nodeType="withEffect">
+                                  <p:stCondLst>
+                                    <p:cond delay="0"/>
+                                  </p:stCondLst>
+                                  <p:childTnLst>
+                                    <p:set>
+                                      <p:cBhvr>
+                                        <p:cTn id="8" dur="1" fill="hold">
+                                          <p:stCondLst>
+                                            <p:cond delay="0"/>
+                                          </p:stCondLst>
+                                        </p:cTn>
+                                        <p:tgtEl>
+                                          <p:spTgt spid="4">
+                                            <p:txEl>
+                                              <p:pRg st="1" end="1"/>
+                                            </p:txEl>
+                                          </p:spTgt>
+                                        </p:tgtEl>
+                                        <p:attrNameLst>
+                                          <p:attrName>style.visibility</p:attrName>
+                                        </p:attrNameLst>
+                                      </p:cBhvr>
+                                      <p:to>
+                                        <p:strVal val="visible"/>
+                                      </p:to>
+                                    </p:set>
+                                  </p:childTnLst>
+                                </p:cTn>
+                              </p:par>
+                              <p:par>
+                                <p:cTn id="9" presetID="1" presetClass="entr" presetSubtype="0" fill="hold" grpId="0" nodeType="withEffect">
+                                  <p:stCondLst>
+                                    <p:cond delay="0"/>
+                                  </p:stCondLst>
+                                  <p:childTnLst>
+                                    <p:set>
+                                      <p:cBhvr>
+                                        <p:cTn id="10" dur="1" fill="hold">
+                                          <p:stCondLst>
+                                            <p:cond delay="0"/>
+                                          </p:stCondLst>
+                                        </p:cTn>
+                                        <p:tgtEl>
+                                          <p:spTgt spid="4">
+                                            <p:txEl>
+                                              <p:pRg st="2" end="2"/>
+                                            </p:txEl>
+                                          </p:spTgt>
+                                        </p:tgtEl>
+                                        <p:attrNameLst>
+                                          <p:attrName>style.visibility</p:attrName>
+                                        </p:attrNameLst>
+                                      </p:cBhvr>
+                                      <p:to>
+                                        <p:strVal val="visible"/>
+                                      </p:to>
+                                    </p:set>
+                                  </p:childTnLst>
+                                </p:cTn>
+                              </p:par>
+                              <p:par>
+                                <p:cTn id="11" presetID="1" presetClass="entr" presetSubtype="0" fill="hold" grpId="0" nodeType="withEffect">
+                                  <p:stCondLst>
+                                    <p:cond delay="0"/>
+                                  </p:stCondLst>
+                                  <p:childTnLst>
+                                    <p:set>
+                                      <p:cBhvr>
+                                        <p:cTn id="12" dur="1" fill="hold">
+                                          <p:stCondLst>
+                                            <p:cond delay="0"/>
+                                          </p:stCondLst>
+                                        </p:cTn>
+                                        <p:tgtEl>
+                                          <p:spTgt spid="4">
+                                            <p:txEl>
+                                              <p:pRg st="3" end="3"/>
+                                            </p:txEl>
+                                          </p:spTgt>
+                                        </p:tgtEl>
+                                        <p:attrNameLst>
+                                          <p:attrName>style.visibility</p:attrName>
+                                        </p:attrNameLst>
+                                      </p:cBhvr>
+                                      <p:to>
+                                        <p:strVal val="visible"/>
+                                      </p:to>
+                                    </p:set>
+                                  </p:childTnLst>
+                                </p:cTn>
+                              </p:par>
+                            </p:childTnLst>
+                          </p:cTn>
+                        </p:par>
+                      </p:childTnLst>
+                    </p:cTn>
+                  </p:par>
+                </p:childTnLst>
+              </p:cTn>
+              <p:prevCondLst>
+                <p:cond evt="onPrev" delay="0">
+                  <p:tgtEl>
+                    <p:sldTgt/>
+                  </p:tgtEl>
+                </p:cond>
+              </p:prevCondLst>
+              <p:nextCondLst>
+                <p:cond evt="onNext" delay="0">
+                  <p:tgtEl>
+                    <p:sldTgt/>
+                  </p:tgtEl>
+                </p:cond>
+              </p:nextCondLst>
+            </p:seq>
+          </p:childTnLst>
+        </p:cTn>
+      </p:par>
+    </p:tnLst>
+    <p:bldLst>
+      <p:bldP spid="4" grpId="0" uiExpand="1" build="p"/>
+    </p:bldLst>
+  </p:timing>
+</p:sld>
+</file>
+
 <file path=ppt/slides/slide2.xml><?xml version="1.0" encoding="utf-8"?>
 <p:sld xmlns:a="http://schemas.openxmlformats.org/drawingml/2006/main" xmlns:r="http://schemas.openxmlformats.org/officeDocument/2006/relationships" xmlns:p="http://schemas.openxmlformats.org/presentationml/2006/main">
   <p:cSld>
@@ -35657,7 +36142,7 @@
         <p:spPr>
           <a:xfrm>
             <a:off x="479419" y="1034934"/>
-            <a:ext cx="11514400" cy="954107"/>
+            <a:ext cx="11514400" cy="1384995"/>
           </a:xfrm>
           <a:prstGeom prst="rect">
             <a:avLst/>
@@ -35688,11 +36173,18 @@
               <a:buChar char="•"/>
             </a:pPr>
             <a:r>
-              <a:rPr lang="en-CH" sz="2800">
+              <a:rPr lang="en-CH" sz="2800" dirty="0">
                 <a:latin typeface="Calibri" panose="020F0502020204030204" pitchFamily="34" charset="0"/>
                 <a:cs typeface="Calibri" panose="020F0502020204030204" pitchFamily="34" charset="0"/>
               </a:rPr>
-              <a:t>If you missed the workshop and are not sure what to do, come to the next </a:t>
+              <a:t>If you missed the workshop and are not sure what to do, come to the next study hall (tomorrow at 3pm U</a:t>
+            </a:r>
+            <a:r>
+              <a:rPr lang="en-GB" sz="2800" dirty="0">
+                <a:latin typeface="Calibri" panose="020F0502020204030204" pitchFamily="34" charset="0"/>
+                <a:cs typeface="Calibri" panose="020F0502020204030204" pitchFamily="34" charset="0"/>
+              </a:rPr>
+              <a:t>TC+2)</a:t>
             </a:r>
             <a:endParaRPr lang="en-CH" sz="2800" dirty="0">
               <a:latin typeface="Calibri" panose="020F0502020204030204" pitchFamily="34" charset="0"/>
@@ -36154,6 +36646,244 @@
         <p:spPr>
           <a:xfrm>
             <a:off x="355478" y="128981"/>
+            <a:ext cx="3584636" cy="523220"/>
+          </a:xfrm>
+          <a:prstGeom prst="rect">
+            <a:avLst/>
+          </a:prstGeom>
+          <a:noFill/>
+        </p:spPr>
+        <p:txBody>
+          <a:bodyPr wrap="none">
+            <a:spAutoFit/>
+          </a:bodyPr>
+          <a:lstStyle/>
+          <a:p>
+            <a:r>
+              <a:rPr lang="en-US" sz="2800" b="1" dirty="0">
+                <a:latin typeface="Avenir Next" panose="020B0503020202020204" pitchFamily="34" charset="0"/>
+              </a:rPr>
+              <a:t>Shrink your sidebar</a:t>
+            </a:r>
+          </a:p>
+        </p:txBody>
+      </p:sp>
+      <p:sp>
+        <p:nvSpPr>
+          <p:cNvPr id="15" name="TextBox 14">
+            <a:extLst>
+              <a:ext uri="{FF2B5EF4-FFF2-40B4-BE49-F238E27FC236}">
+                <a16:creationId xmlns:a16="http://schemas.microsoft.com/office/drawing/2014/main" id="{F95E1D9C-E254-D552-9761-0824FC52FB80}"/>
+              </a:ext>
+            </a:extLst>
+          </p:cNvPr>
+          <p:cNvSpPr txBox="1"/>
+          <p:nvPr/>
+        </p:nvSpPr>
+        <p:spPr>
+          <a:xfrm>
+            <a:off x="479419" y="1034934"/>
+            <a:ext cx="11514400" cy="523220"/>
+          </a:xfrm>
+          <a:prstGeom prst="rect">
+            <a:avLst/>
+          </a:prstGeom>
+          <a:noFill/>
+        </p:spPr>
+        <p:txBody>
+          <a:bodyPr wrap="square" rtlCol="0">
+            <a:spAutoFit/>
+          </a:bodyPr>
+          <a:lstStyle/>
+          <a:p>
+            <a:pPr marL="457189" indent="-457189">
+              <a:buFont typeface="Arial" panose="020B0604020202020204" pitchFamily="34" charset="0"/>
+              <a:buChar char="•"/>
+            </a:pPr>
+            <a:r>
+              <a:rPr lang="en-CH" sz="2800">
+                <a:latin typeface="Calibri" panose="020F0502020204030204" pitchFamily="34" charset="0"/>
+                <a:cs typeface="Calibri" panose="020F0502020204030204" pitchFamily="34" charset="0"/>
+              </a:rPr>
+              <a:t>Onboarding tutorial coming soon</a:t>
+            </a:r>
+            <a:endParaRPr lang="en-CH" sz="2800" dirty="0">
+              <a:latin typeface="Calibri" panose="020F0502020204030204" pitchFamily="34" charset="0"/>
+              <a:cs typeface="Calibri" panose="020F0502020204030204" pitchFamily="34" charset="0"/>
+            </a:endParaRPr>
+          </a:p>
+        </p:txBody>
+      </p:sp>
+    </p:spTree>
+    <p:extLst>
+      <p:ext uri="{BB962C8B-B14F-4D97-AF65-F5344CB8AC3E}">
+        <p14:creationId xmlns:p14="http://schemas.microsoft.com/office/powerpoint/2010/main" val="988613823"/>
+      </p:ext>
+    </p:extLst>
+  </p:cSld>
+  <p:clrMapOvr>
+    <a:masterClrMapping/>
+  </p:clrMapOvr>
+  <p:timing>
+    <p:tnLst>
+      <p:par>
+        <p:cTn id="1" dur="indefinite" restart="never" nodeType="tmRoot">
+          <p:childTnLst>
+            <p:seq concurrent="1" nextAc="seek">
+              <p:cTn id="2" dur="indefinite" nodeType="mainSeq">
+                <p:childTnLst>
+                  <p:par>
+                    <p:cTn id="3" fill="hold">
+                      <p:stCondLst>
+                        <p:cond delay="indefinite"/>
+                      </p:stCondLst>
+                      <p:childTnLst>
+                        <p:par>
+                          <p:cTn id="4" fill="hold">
+                            <p:stCondLst>
+                              <p:cond delay="0"/>
+                            </p:stCondLst>
+                            <p:childTnLst>
+                              <p:par>
+                                <p:cTn id="5" presetID="1" presetClass="entr" presetSubtype="0" fill="hold" grpId="0" nodeType="clickEffect">
+                                  <p:stCondLst>
+                                    <p:cond delay="0"/>
+                                  </p:stCondLst>
+                                  <p:childTnLst>
+                                    <p:set>
+                                      <p:cBhvr>
+                                        <p:cTn id="6" dur="1" fill="hold">
+                                          <p:stCondLst>
+                                            <p:cond delay="0"/>
+                                          </p:stCondLst>
+                                        </p:cTn>
+                                        <p:tgtEl>
+                                          <p:spTgt spid="15">
+                                            <p:txEl>
+                                              <p:pRg st="0" end="0"/>
+                                            </p:txEl>
+                                          </p:spTgt>
+                                        </p:tgtEl>
+                                        <p:attrNameLst>
+                                          <p:attrName>style.visibility</p:attrName>
+                                        </p:attrNameLst>
+                                      </p:cBhvr>
+                                      <p:to>
+                                        <p:strVal val="visible"/>
+                                      </p:to>
+                                    </p:set>
+                                  </p:childTnLst>
+                                </p:cTn>
+                              </p:par>
+                            </p:childTnLst>
+                          </p:cTn>
+                        </p:par>
+                      </p:childTnLst>
+                    </p:cTn>
+                  </p:par>
+                </p:childTnLst>
+              </p:cTn>
+              <p:prevCondLst>
+                <p:cond evt="onPrev" delay="0">
+                  <p:tgtEl>
+                    <p:sldTgt/>
+                  </p:tgtEl>
+                </p:cond>
+              </p:prevCondLst>
+              <p:nextCondLst>
+                <p:cond evt="onNext" delay="0">
+                  <p:tgtEl>
+                    <p:sldTgt/>
+                  </p:tgtEl>
+                </p:cond>
+              </p:nextCondLst>
+            </p:seq>
+          </p:childTnLst>
+        </p:cTn>
+      </p:par>
+    </p:tnLst>
+    <p:bldLst>
+      <p:bldP spid="15" grpId="0" uiExpand="1" build="p"/>
+    </p:bldLst>
+  </p:timing>
+</p:sld>
+</file>
+
+<file path=ppt/slides/slide9.xml><?xml version="1.0" encoding="utf-8"?>
+<p:sld xmlns:a="http://schemas.openxmlformats.org/drawingml/2006/main" xmlns:r="http://schemas.openxmlformats.org/officeDocument/2006/relationships" xmlns:p="http://schemas.openxmlformats.org/presentationml/2006/main">
+  <p:cSld>
+    <p:spTree>
+      <p:nvGrpSpPr>
+        <p:cNvPr id="1" name=""/>
+        <p:cNvGrpSpPr/>
+        <p:nvPr/>
+      </p:nvGrpSpPr>
+      <p:grpSpPr>
+        <a:xfrm>
+          <a:off x="0" y="0"/>
+          <a:ext cx="0" cy="0"/>
+          <a:chOff x="0" y="0"/>
+          <a:chExt cx="0" cy="0"/>
+        </a:xfrm>
+      </p:grpSpPr>
+      <p:cxnSp>
+        <p:nvCxnSpPr>
+          <p:cNvPr id="43" name="Straight Connector 42">
+            <a:extLst>
+              <a:ext uri="{FF2B5EF4-FFF2-40B4-BE49-F238E27FC236}">
+                <a16:creationId xmlns:a16="http://schemas.microsoft.com/office/drawing/2014/main" id="{3A5077C6-7E4F-2F4E-BD92-B687C1BB85ED}"/>
+              </a:ext>
+            </a:extLst>
+          </p:cNvPr>
+          <p:cNvCxnSpPr>
+            <a:cxnSpLocks/>
+          </p:cNvCxnSpPr>
+          <p:nvPr/>
+        </p:nvCxnSpPr>
+        <p:spPr>
+          <a:xfrm>
+            <a:off x="479419" y="647537"/>
+            <a:ext cx="744431" cy="0"/>
+          </a:xfrm>
+          <a:prstGeom prst="line">
+            <a:avLst/>
+          </a:prstGeom>
+          <a:ln w="38100">
+            <a:solidFill>
+              <a:srgbClr val="57A7B1"/>
+            </a:solidFill>
+          </a:ln>
+        </p:spPr>
+        <p:style>
+          <a:lnRef idx="1">
+            <a:schemeClr val="accent1"/>
+          </a:lnRef>
+          <a:fillRef idx="0">
+            <a:schemeClr val="accent1"/>
+          </a:fillRef>
+          <a:effectRef idx="0">
+            <a:schemeClr val="accent1"/>
+          </a:effectRef>
+          <a:fontRef idx="minor">
+            <a:schemeClr val="tx1"/>
+          </a:fontRef>
+        </p:style>
+      </p:cxnSp>
+      <p:sp>
+        <p:nvSpPr>
+          <p:cNvPr id="44" name="TextBox 43">
+            <a:extLst>
+              <a:ext uri="{FF2B5EF4-FFF2-40B4-BE49-F238E27FC236}">
+                <a16:creationId xmlns:a16="http://schemas.microsoft.com/office/drawing/2014/main" id="{BFA7D6A8-F365-734B-A552-638838DBD786}"/>
+              </a:ext>
+            </a:extLst>
+          </p:cNvPr>
+          <p:cNvSpPr txBox="1"/>
+          <p:nvPr/>
+        </p:nvSpPr>
+        <p:spPr>
+          <a:xfrm>
+            <a:off x="355478" y="128981"/>
             <a:ext cx="3446649" cy="523220"/>
           </a:xfrm>
           <a:prstGeom prst="rect">
@@ -36432,376 +37162,6 @@
     </p:tnLst>
     <p:bldLst>
       <p:bldP spid="15" grpId="0" uiExpand="1" build="p"/>
-    </p:bldLst>
-  </p:timing>
-</p:sld>
-</file>
-
-<file path=ppt/slides/slide9.xml><?xml version="1.0" encoding="utf-8"?>
-<p:sld xmlns:a="http://schemas.openxmlformats.org/drawingml/2006/main" xmlns:r="http://schemas.openxmlformats.org/officeDocument/2006/relationships" xmlns:p="http://schemas.openxmlformats.org/presentationml/2006/main">
-  <p:cSld>
-    <p:spTree>
-      <p:nvGrpSpPr>
-        <p:cNvPr id="1" name=""/>
-        <p:cNvGrpSpPr/>
-        <p:nvPr/>
-      </p:nvGrpSpPr>
-      <p:grpSpPr>
-        <a:xfrm>
-          <a:off x="0" y="0"/>
-          <a:ext cx="0" cy="0"/>
-          <a:chOff x="0" y="0"/>
-          <a:chExt cx="0" cy="0"/>
-        </a:xfrm>
-      </p:grpSpPr>
-      <p:cxnSp>
-        <p:nvCxnSpPr>
-          <p:cNvPr id="43" name="Straight Connector 42">
-            <a:extLst>
-              <a:ext uri="{FF2B5EF4-FFF2-40B4-BE49-F238E27FC236}">
-                <a16:creationId xmlns:a16="http://schemas.microsoft.com/office/drawing/2014/main" id="{3A5077C6-7E4F-2F4E-BD92-B687C1BB85ED}"/>
-              </a:ext>
-            </a:extLst>
-          </p:cNvPr>
-          <p:cNvCxnSpPr>
-            <a:cxnSpLocks/>
-          </p:cNvCxnSpPr>
-          <p:nvPr/>
-        </p:nvCxnSpPr>
-        <p:spPr>
-          <a:xfrm>
-            <a:off x="479419" y="647537"/>
-            <a:ext cx="744431" cy="0"/>
-          </a:xfrm>
-          <a:prstGeom prst="line">
-            <a:avLst/>
-          </a:prstGeom>
-          <a:ln w="38100">
-            <a:solidFill>
-              <a:srgbClr val="57A7B1"/>
-            </a:solidFill>
-          </a:ln>
-        </p:spPr>
-        <p:style>
-          <a:lnRef idx="1">
-            <a:schemeClr val="accent1"/>
-          </a:lnRef>
-          <a:fillRef idx="0">
-            <a:schemeClr val="accent1"/>
-          </a:fillRef>
-          <a:effectRef idx="0">
-            <a:schemeClr val="accent1"/>
-          </a:effectRef>
-          <a:fontRef idx="minor">
-            <a:schemeClr val="tx1"/>
-          </a:fontRef>
-        </p:style>
-      </p:cxnSp>
-      <p:sp>
-        <p:nvSpPr>
-          <p:cNvPr id="44" name="TextBox 43">
-            <a:extLst>
-              <a:ext uri="{FF2B5EF4-FFF2-40B4-BE49-F238E27FC236}">
-                <a16:creationId xmlns:a16="http://schemas.microsoft.com/office/drawing/2014/main" id="{BFA7D6A8-F365-734B-A552-638838DBD786}"/>
-              </a:ext>
-            </a:extLst>
-          </p:cNvPr>
-          <p:cNvSpPr txBox="1"/>
-          <p:nvPr/>
-        </p:nvSpPr>
-        <p:spPr>
-          <a:xfrm>
-            <a:off x="355478" y="128981"/>
-            <a:ext cx="3781741" cy="523220"/>
-          </a:xfrm>
-          <a:prstGeom prst="rect">
-            <a:avLst/>
-          </a:prstGeom>
-          <a:noFill/>
-        </p:spPr>
-        <p:txBody>
-          <a:bodyPr wrap="none">
-            <a:spAutoFit/>
-          </a:bodyPr>
-          <a:lstStyle/>
-          <a:p>
-            <a:r>
-              <a:rPr lang="en-US" sz="2800" b="1" dirty="0">
-                <a:latin typeface="Avenir Next" panose="020B0503020202020204" pitchFamily="34" charset="0"/>
-              </a:rPr>
-              <a:t>Study hall reminders</a:t>
-            </a:r>
-          </a:p>
-        </p:txBody>
-      </p:sp>
-      <p:sp>
-        <p:nvSpPr>
-          <p:cNvPr id="4" name="TextBox 3">
-            <a:extLst>
-              <a:ext uri="{FF2B5EF4-FFF2-40B4-BE49-F238E27FC236}">
-                <a16:creationId xmlns:a16="http://schemas.microsoft.com/office/drawing/2014/main" id="{1745B0C2-3181-F6C6-FF23-F512941CE866}"/>
-              </a:ext>
-            </a:extLst>
-          </p:cNvPr>
-          <p:cNvSpPr txBox="1"/>
-          <p:nvPr/>
-        </p:nvSpPr>
-        <p:spPr>
-          <a:xfrm>
-            <a:off x="355477" y="816645"/>
-            <a:ext cx="11514400" cy="1877437"/>
-          </a:xfrm>
-          <a:prstGeom prst="rect">
-            <a:avLst/>
-          </a:prstGeom>
-          <a:noFill/>
-        </p:spPr>
-        <p:txBody>
-          <a:bodyPr wrap="square" rtlCol="0">
-            <a:spAutoFit/>
-          </a:bodyPr>
-          <a:lstStyle/>
-          <a:p>
-            <a:pPr marL="457189" indent="-457189">
-              <a:buFont typeface="Arial" panose="020B0604020202020204" pitchFamily="34" charset="0"/>
-              <a:buChar char="•"/>
-            </a:pPr>
-            <a:r>
-              <a:rPr lang="en-CH" sz="3200" dirty="0">
-                <a:latin typeface="Calibri" panose="020F0502020204030204" pitchFamily="34" charset="0"/>
-                <a:cs typeface="Calibri" panose="020F0502020204030204" pitchFamily="34" charset="0"/>
-              </a:rPr>
-              <a:t>Optional study hall sessions three times a week</a:t>
-            </a:r>
-            <a:endParaRPr lang="en-CH" sz="2800" dirty="0">
-              <a:latin typeface="Calibri" panose="020F0502020204030204" pitchFamily="34" charset="0"/>
-              <a:cs typeface="Calibri" panose="020F0502020204030204" pitchFamily="34" charset="0"/>
-            </a:endParaRPr>
-          </a:p>
-          <a:p>
-            <a:pPr marL="914389" lvl="1" indent="-457189">
-              <a:buFont typeface="Arial" panose="020B0604020202020204" pitchFamily="34" charset="0"/>
-              <a:buChar char="•"/>
-            </a:pPr>
-            <a:r>
-              <a:rPr lang="en-CH" sz="2800" dirty="0">
-                <a:latin typeface="Calibri" panose="020F0502020204030204" pitchFamily="34" charset="0"/>
-                <a:cs typeface="Calibri" panose="020F0502020204030204" pitchFamily="34" charset="0"/>
-              </a:rPr>
-              <a:t>Wednesday 3 to 5 pm UTC+2</a:t>
-            </a:r>
-          </a:p>
-          <a:p>
-            <a:pPr marL="914389" lvl="1" indent="-457189">
-              <a:buFont typeface="Arial" panose="020B0604020202020204" pitchFamily="34" charset="0"/>
-              <a:buChar char="•"/>
-            </a:pPr>
-            <a:r>
-              <a:rPr lang="en-CH" sz="2800" dirty="0">
-                <a:latin typeface="Calibri" panose="020F0502020204030204" pitchFamily="34" charset="0"/>
-                <a:cs typeface="Calibri" panose="020F0502020204030204" pitchFamily="34" charset="0"/>
-              </a:rPr>
-              <a:t>Thursday 6 to 8 pm UTC+2</a:t>
-            </a:r>
-          </a:p>
-          <a:p>
-            <a:pPr marL="914389" lvl="1" indent="-457189">
-              <a:buFont typeface="Arial" panose="020B0604020202020204" pitchFamily="34" charset="0"/>
-              <a:buChar char="•"/>
-            </a:pPr>
-            <a:r>
-              <a:rPr lang="en-CH" sz="2800" dirty="0">
-                <a:latin typeface="Calibri" panose="020F0502020204030204" pitchFamily="34" charset="0"/>
-                <a:cs typeface="Calibri" panose="020F0502020204030204" pitchFamily="34" charset="0"/>
-              </a:rPr>
-              <a:t>Sunday 5 to 7 pm UTC+2</a:t>
-            </a:r>
-          </a:p>
-        </p:txBody>
-      </p:sp>
-    </p:spTree>
-    <p:extLst>
-      <p:ext uri="{BB962C8B-B14F-4D97-AF65-F5344CB8AC3E}">
-        <p14:creationId xmlns:p14="http://schemas.microsoft.com/office/powerpoint/2010/main" val="3514718426"/>
-      </p:ext>
-    </p:extLst>
-  </p:cSld>
-  <p:clrMapOvr>
-    <a:masterClrMapping/>
-  </p:clrMapOvr>
-  <p:timing>
-    <p:tnLst>
-      <p:par>
-        <p:cTn id="1" dur="indefinite" restart="never" nodeType="tmRoot">
-          <p:childTnLst>
-            <p:seq concurrent="1" nextAc="seek">
-              <p:cTn id="2" dur="indefinite" nodeType="mainSeq">
-                <p:childTnLst>
-                  <p:par>
-                    <p:cTn id="3" fill="hold">
-                      <p:stCondLst>
-                        <p:cond delay="indefinite"/>
-                      </p:stCondLst>
-                      <p:childTnLst>
-                        <p:par>
-                          <p:cTn id="4" fill="hold">
-                            <p:stCondLst>
-                              <p:cond delay="0"/>
-                            </p:stCondLst>
-                            <p:childTnLst>
-                              <p:par>
-                                <p:cTn id="5" presetID="1" presetClass="entr" presetSubtype="0" fill="hold" grpId="0" nodeType="clickEffect">
-                                  <p:stCondLst>
-                                    <p:cond delay="0"/>
-                                  </p:stCondLst>
-                                  <p:childTnLst>
-                                    <p:set>
-                                      <p:cBhvr>
-                                        <p:cTn id="6" dur="1" fill="hold">
-                                          <p:stCondLst>
-                                            <p:cond delay="0"/>
-                                          </p:stCondLst>
-                                        </p:cTn>
-                                        <p:tgtEl>
-                                          <p:spTgt spid="4">
-                                            <p:txEl>
-                                              <p:pRg st="0" end="0"/>
-                                            </p:txEl>
-                                          </p:spTgt>
-                                        </p:tgtEl>
-                                        <p:attrNameLst>
-                                          <p:attrName>style.visibility</p:attrName>
-                                        </p:attrNameLst>
-                                      </p:cBhvr>
-                                      <p:to>
-                                        <p:strVal val="visible"/>
-                                      </p:to>
-                                    </p:set>
-                                  </p:childTnLst>
-                                </p:cTn>
-                              </p:par>
-                              <p:par>
-                                <p:cTn id="7" presetID="1" presetClass="entr" presetSubtype="0" fill="hold" grpId="0" nodeType="withEffect">
-                                  <p:stCondLst>
-                                    <p:cond delay="0"/>
-                                  </p:stCondLst>
-                                  <p:childTnLst>
-                                    <p:set>
-                                      <p:cBhvr>
-                                        <p:cTn id="8" dur="1" fill="hold">
-                                          <p:stCondLst>
-                                            <p:cond delay="0"/>
-                                          </p:stCondLst>
-                                        </p:cTn>
-                                        <p:tgtEl>
-                                          <p:spTgt spid="4">
-                                            <p:txEl>
-                                              <p:pRg st="1" end="1"/>
-                                            </p:txEl>
-                                          </p:spTgt>
-                                        </p:tgtEl>
-                                        <p:attrNameLst>
-                                          <p:attrName>style.visibility</p:attrName>
-                                        </p:attrNameLst>
-                                      </p:cBhvr>
-                                      <p:to>
-                                        <p:strVal val="visible"/>
-                                      </p:to>
-                                    </p:set>
-                                  </p:childTnLst>
-                                </p:cTn>
-                              </p:par>
-                              <p:par>
-                                <p:cTn id="9" presetID="1" presetClass="entr" presetSubtype="0" fill="hold" grpId="0" nodeType="withEffect">
-                                  <p:stCondLst>
-                                    <p:cond delay="0"/>
-                                  </p:stCondLst>
-                                  <p:childTnLst>
-                                    <p:set>
-                                      <p:cBhvr>
-                                        <p:cTn id="10" dur="1" fill="hold">
-                                          <p:stCondLst>
-                                            <p:cond delay="0"/>
-                                          </p:stCondLst>
-                                        </p:cTn>
-                                        <p:tgtEl>
-                                          <p:spTgt spid="4">
-                                            <p:txEl>
-                                              <p:pRg st="2" end="2"/>
-                                            </p:txEl>
-                                          </p:spTgt>
-                                        </p:tgtEl>
-                                        <p:attrNameLst>
-                                          <p:attrName>style.visibility</p:attrName>
-                                        </p:attrNameLst>
-                                      </p:cBhvr>
-                                      <p:to>
-                                        <p:strVal val="visible"/>
-                                      </p:to>
-                                    </p:set>
-                                  </p:childTnLst>
-                                </p:cTn>
-                              </p:par>
-                              <p:par>
-                                <p:cTn id="11" presetID="1" presetClass="entr" presetSubtype="0" fill="hold" grpId="0" nodeType="withEffect">
-                                  <p:stCondLst>
-                                    <p:cond delay="0"/>
-                                  </p:stCondLst>
-                                  <p:childTnLst>
-                                    <p:set>
-                                      <p:cBhvr>
-                                        <p:cTn id="12" dur="1" fill="hold">
-                                          <p:stCondLst>
-                                            <p:cond delay="0"/>
-                                          </p:stCondLst>
-                                        </p:cTn>
-                                        <p:tgtEl>
-                                          <p:spTgt spid="4">
-                                            <p:txEl>
-                                              <p:pRg st="3" end="3"/>
-                                            </p:txEl>
-                                          </p:spTgt>
-                                        </p:tgtEl>
-                                        <p:attrNameLst>
-                                          <p:attrName>style.visibility</p:attrName>
-                                        </p:attrNameLst>
-                                      </p:cBhvr>
-                                      <p:to>
-                                        <p:strVal val="visible"/>
-                                      </p:to>
-                                    </p:set>
-                                  </p:childTnLst>
-                                </p:cTn>
-                              </p:par>
-                            </p:childTnLst>
-                          </p:cTn>
-                        </p:par>
-                      </p:childTnLst>
-                    </p:cTn>
-                  </p:par>
-                </p:childTnLst>
-              </p:cTn>
-              <p:prevCondLst>
-                <p:cond evt="onPrev" delay="0">
-                  <p:tgtEl>
-                    <p:sldTgt/>
-                  </p:tgtEl>
-                </p:cond>
-              </p:prevCondLst>
-              <p:nextCondLst>
-                <p:cond evt="onNext" delay="0">
-                  <p:tgtEl>
-                    <p:sldTgt/>
-                  </p:tgtEl>
-                </p:cond>
-              </p:nextCondLst>
-            </p:seq>
-          </p:childTnLst>
-        </p:cTn>
-      </p:par>
-    </p:tnLst>
-    <p:bldLst>
-      <p:bldP spid="4" grpId="0" uiExpand="1" build="p"/>
     </p:bldLst>
   </p:timing>
 </p:sld>

</xml_diff>

<commit_message>
slides update et al
</commit_message>
<xml_diff>
--- a/week_03/slides/rbp_workshop_03.pptx
+++ b/week_03/slides/rbp_workshop_03.pptx
@@ -5,7 +5,7 @@
     <p:sldMasterId id="2147483648" r:id="rId1"/>
   </p:sldMasterIdLst>
   <p:notesMasterIdLst>
-    <p:notesMasterId r:id="rId12"/>
+    <p:notesMasterId r:id="rId13"/>
   </p:notesMasterIdLst>
   <p:sldIdLst>
     <p:sldId id="1778" r:id="rId2"/>
@@ -18,6 +18,7 @@
     <p:sldId id="1797" r:id="rId9"/>
     <p:sldId id="1793" r:id="rId10"/>
     <p:sldId id="1738" r:id="rId11"/>
+    <p:sldId id="1798" r:id="rId12"/>
   </p:sldIdLst>
   <p:sldSz cx="12192000" cy="6858000"/>
   <p:notesSz cx="6858000" cy="9144000"/>
@@ -31083,6 +31084,115 @@
     <p:extLst>
       <p:ext uri="{BB962C8B-B14F-4D97-AF65-F5344CB8AC3E}">
         <p14:creationId xmlns:p14="http://schemas.microsoft.com/office/powerpoint/2010/main" val="819424315"/>
+      </p:ext>
+    </p:extLst>
+  </p:cSld>
+  <p:clrMapOvr>
+    <a:masterClrMapping/>
+  </p:clrMapOvr>
+</p:notes>
+</file>
+
+<file path=ppt/notesSlides/notesSlide11.xml><?xml version="1.0" encoding="utf-8"?>
+<p:notes xmlns:a="http://schemas.openxmlformats.org/drawingml/2006/main" xmlns:r="http://schemas.openxmlformats.org/officeDocument/2006/relationships" xmlns:p="http://schemas.openxmlformats.org/presentationml/2006/main" showMasterSp="0" showMasterPhAnim="0">
+  <p:cSld>
+    <p:spTree>
+      <p:nvGrpSpPr>
+        <p:cNvPr id="1" name="Shape 45"/>
+        <p:cNvGrpSpPr/>
+        <p:nvPr/>
+      </p:nvGrpSpPr>
+      <p:grpSpPr>
+        <a:xfrm>
+          <a:off x="0" y="0"/>
+          <a:ext cx="0" cy="0"/>
+          <a:chOff x="0" y="0"/>
+          <a:chExt cx="0" cy="0"/>
+        </a:xfrm>
+      </p:grpSpPr>
+      <p:sp>
+        <p:nvSpPr>
+          <p:cNvPr id="46" name="Google Shape;46;g15964faf8e4_0_0:notes"/>
+          <p:cNvSpPr>
+            <a:spLocks noGrp="1" noRot="1" noChangeAspect="1"/>
+          </p:cNvSpPr>
+          <p:nvPr>
+            <p:ph type="sldImg" idx="2"/>
+          </p:nvPr>
+        </p:nvSpPr>
+        <p:spPr>
+          <a:xfrm>
+            <a:off x="381000" y="685800"/>
+            <a:ext cx="6096000" cy="3429000"/>
+          </a:xfrm>
+          <a:custGeom>
+            <a:avLst/>
+            <a:gdLst/>
+            <a:ahLst/>
+            <a:cxnLst/>
+            <a:rect l="l" t="t" r="r" b="b"/>
+            <a:pathLst>
+              <a:path w="120000" h="120000" extrusionOk="0">
+                <a:moveTo>
+                  <a:pt x="0" y="0"/>
+                </a:moveTo>
+                <a:lnTo>
+                  <a:pt x="120000" y="0"/>
+                </a:lnTo>
+                <a:lnTo>
+                  <a:pt x="120000" y="120000"/>
+                </a:lnTo>
+                <a:lnTo>
+                  <a:pt x="0" y="120000"/>
+                </a:lnTo>
+                <a:close/>
+              </a:path>
+            </a:pathLst>
+          </a:custGeom>
+        </p:spPr>
+      </p:sp>
+      <p:sp>
+        <p:nvSpPr>
+          <p:cNvPr id="47" name="Google Shape;47;g15964faf8e4_0_0:notes"/>
+          <p:cNvSpPr txBox="1">
+            <a:spLocks noGrp="1"/>
+          </p:cNvSpPr>
+          <p:nvPr>
+            <p:ph type="body" idx="1"/>
+          </p:nvPr>
+        </p:nvSpPr>
+        <p:spPr>
+          <a:xfrm>
+            <a:off x="685800" y="4343400"/>
+            <a:ext cx="5486400" cy="4114800"/>
+          </a:xfrm>
+          <a:prstGeom prst="rect">
+            <a:avLst/>
+          </a:prstGeom>
+        </p:spPr>
+        <p:txBody>
+          <a:bodyPr spcFirstLastPara="1" wrap="square" lIns="91425" tIns="91425" rIns="91425" bIns="91425" anchor="t" anchorCtr="0">
+            <a:noAutofit/>
+          </a:bodyPr>
+          <a:lstStyle/>
+          <a:p>
+            <a:pPr marL="0" lvl="0" indent="0" algn="l" rtl="0">
+              <a:spcBef>
+                <a:spcPts val="0"/>
+              </a:spcBef>
+              <a:spcAft>
+                <a:spcPts val="0"/>
+              </a:spcAft>
+              <a:buNone/>
+            </a:pPr>
+            <a:endParaRPr dirty="0"/>
+          </a:p>
+        </p:txBody>
+      </p:sp>
+    </p:spTree>
+    <p:extLst>
+      <p:ext uri="{BB962C8B-B14F-4D97-AF65-F5344CB8AC3E}">
+        <p14:creationId xmlns:p14="http://schemas.microsoft.com/office/powerpoint/2010/main" val="506552655"/>
       </p:ext>
     </p:extLst>
   </p:cSld>
@@ -34355,6 +34465,217 @@
 </p:sld>
 </file>
 
+<file path=ppt/slides/slide11.xml><?xml version="1.0" encoding="utf-8"?>
+<p:sld xmlns:a="http://schemas.openxmlformats.org/drawingml/2006/main" xmlns:r="http://schemas.openxmlformats.org/officeDocument/2006/relationships" xmlns:p="http://schemas.openxmlformats.org/presentationml/2006/main">
+  <p:cSld>
+    <p:spTree>
+      <p:nvGrpSpPr>
+        <p:cNvPr id="1" name="Shape 48"/>
+        <p:cNvGrpSpPr/>
+        <p:nvPr/>
+      </p:nvGrpSpPr>
+      <p:grpSpPr>
+        <a:xfrm>
+          <a:off x="0" y="0"/>
+          <a:ext cx="0" cy="0"/>
+          <a:chOff x="0" y="0"/>
+          <a:chExt cx="0" cy="0"/>
+        </a:xfrm>
+      </p:grpSpPr>
+      <p:sp>
+        <p:nvSpPr>
+          <p:cNvPr id="49" name="Google Shape;49;p9"/>
+          <p:cNvSpPr txBox="1">
+            <a:spLocks noGrp="1"/>
+          </p:cNvSpPr>
+          <p:nvPr>
+            <p:ph type="body" idx="1"/>
+          </p:nvPr>
+        </p:nvSpPr>
+        <p:spPr>
+          <a:xfrm>
+            <a:off x="317119" y="791763"/>
+            <a:ext cx="11650763" cy="3259826"/>
+          </a:xfrm>
+          <a:prstGeom prst="rect">
+            <a:avLst/>
+          </a:prstGeom>
+        </p:spPr>
+        <p:txBody>
+          <a:bodyPr spcFirstLastPara="1" wrap="square" lIns="91433" tIns="45700" rIns="91433" bIns="45700" anchor="t" anchorCtr="0">
+            <a:spAutoFit/>
+          </a:bodyPr>
+          <a:lstStyle/>
+          <a:p>
+            <a:pPr marL="0" indent="0">
+              <a:lnSpc>
+                <a:spcPct val="100000"/>
+              </a:lnSpc>
+              <a:buNone/>
+              <a:defRPr/>
+            </a:pPr>
+            <a:r>
+              <a:rPr lang="en" sz="3200" dirty="0">
+                <a:solidFill>
+                  <a:schemeClr val="tx1"/>
+                </a:solidFill>
+              </a:rPr>
+              <a:t>1</a:t>
+            </a:r>
+            <a:r>
+              <a:rPr lang="en" sz="3200" kern="0" dirty="0">
+                <a:solidFill>
+                  <a:schemeClr val="tx1"/>
+                </a:solidFill>
+              </a:rPr>
+              <a:t>. 👋🏽 Welcome quiz (10 minutes) </a:t>
+            </a:r>
+          </a:p>
+          <a:p>
+            <a:pPr marL="0" indent="0">
+              <a:lnSpc>
+                <a:spcPct val="100000"/>
+              </a:lnSpc>
+              <a:buNone/>
+              <a:defRPr/>
+            </a:pPr>
+            <a:r>
+              <a:rPr lang="en" sz="3200" dirty="0">
+                <a:solidFill>
+                  <a:schemeClr val="tx1"/>
+                </a:solidFill>
+              </a:rPr>
+              <a:t>2. 📣 Announcements (10 minutes)</a:t>
+            </a:r>
+          </a:p>
+          <a:p>
+            <a:pPr marL="0" indent="0">
+              <a:lnSpc>
+                <a:spcPct val="100000"/>
+              </a:lnSpc>
+              <a:buNone/>
+              <a:defRPr/>
+            </a:pPr>
+            <a:r>
+              <a:rPr lang="en" sz="3200" dirty="0">
+                <a:solidFill>
+                  <a:schemeClr val="tx1"/>
+                </a:solidFill>
+              </a:rPr>
+              <a:t>3. </a:t>
+            </a:r>
+            <a:r>
+              <a:rPr lang="en" sz="3200" kern="0" dirty="0">
+                <a:solidFill>
+                  <a:schemeClr val="tx1"/>
+                </a:solidFill>
+              </a:rPr>
+              <a:t>👩🏽‍💻</a:t>
+            </a:r>
+            <a:r>
+              <a:rPr lang="en" sz="3200" dirty="0">
+                <a:solidFill>
+                  <a:schemeClr val="tx1"/>
+                </a:solidFill>
+              </a:rPr>
+              <a:t> Pair </a:t>
+            </a:r>
+            <a:r>
+              <a:rPr lang="en" sz="3200" kern="0" dirty="0">
+                <a:solidFill>
+                  <a:schemeClr val="tx1"/>
+                </a:solidFill>
+              </a:rPr>
+              <a:t>exercise (60 minutes)</a:t>
+            </a:r>
+          </a:p>
+          <a:p>
+            <a:pPr marL="0" indent="0">
+              <a:lnSpc>
+                <a:spcPct val="100000"/>
+              </a:lnSpc>
+              <a:buNone/>
+              <a:defRPr/>
+            </a:pPr>
+            <a:r>
+              <a:rPr lang="en" sz="3200" kern="0" dirty="0">
+                <a:solidFill>
+                  <a:schemeClr val="tx1"/>
+                </a:solidFill>
+              </a:rPr>
+              <a:t>4. 🥤Optional tea/bathroom/games break (10 minutes)</a:t>
+            </a:r>
+          </a:p>
+          <a:p>
+            <a:pPr marL="0" indent="0">
+              <a:lnSpc>
+                <a:spcPct val="100000"/>
+              </a:lnSpc>
+              <a:buNone/>
+              <a:defRPr/>
+            </a:pPr>
+            <a:r>
+              <a:rPr lang="en" sz="3200" dirty="0">
+                <a:solidFill>
+                  <a:schemeClr val="tx1"/>
+                </a:solidFill>
+              </a:rPr>
+              <a:t>5. 📽 Presentations (40 minutes)</a:t>
+            </a:r>
+            <a:endParaRPr lang="en" sz="3200" kern="0" dirty="0">
+              <a:solidFill>
+                <a:schemeClr val="tx1"/>
+              </a:solidFill>
+            </a:endParaRPr>
+          </a:p>
+        </p:txBody>
+      </p:sp>
+      <p:sp>
+        <p:nvSpPr>
+          <p:cNvPr id="50" name="Google Shape;50;p9"/>
+          <p:cNvSpPr txBox="1">
+            <a:spLocks noGrp="1"/>
+          </p:cNvSpPr>
+          <p:nvPr>
+            <p:ph type="title"/>
+          </p:nvPr>
+        </p:nvSpPr>
+        <p:spPr>
+          <a:xfrm>
+            <a:off x="317119" y="256217"/>
+            <a:ext cx="5778800" cy="535491"/>
+          </a:xfrm>
+          <a:prstGeom prst="rect">
+            <a:avLst/>
+          </a:prstGeom>
+        </p:spPr>
+        <p:txBody>
+          <a:bodyPr spcFirstLastPara="1" vert="horz" wrap="square" lIns="91433" tIns="45700" rIns="91433" bIns="45700" rtlCol="0" anchor="ctr" anchorCtr="0">
+            <a:spAutoFit/>
+          </a:bodyPr>
+          <a:lstStyle/>
+          <a:p>
+            <a:r>
+              <a:rPr lang="en" dirty="0"/>
+              <a:t>Workshop outline</a:t>
+            </a:r>
+            <a:endParaRPr dirty="0"/>
+          </a:p>
+        </p:txBody>
+      </p:sp>
+    </p:spTree>
+    <p:extLst>
+      <p:ext uri="{BB962C8B-B14F-4D97-AF65-F5344CB8AC3E}">
+        <p14:creationId xmlns:p14="http://schemas.microsoft.com/office/powerpoint/2010/main" val="2887006889"/>
+      </p:ext>
+    </p:extLst>
+  </p:cSld>
+  <p:clrMapOvr>
+    <a:masterClrMapping/>
+  </p:clrMapOvr>
+</p:sld>
+</file>
+
 <file path=ppt/slides/slide2.xml><?xml version="1.0" encoding="utf-8"?>
 <p:sld xmlns:a="http://schemas.openxmlformats.org/drawingml/2006/main" xmlns:r="http://schemas.openxmlformats.org/officeDocument/2006/relationships" xmlns:p="http://schemas.openxmlformats.org/presentationml/2006/main">
   <p:cSld>
@@ -34700,7 +35021,7 @@
                 <a:latin typeface="Calibri" panose="020F0502020204030204" pitchFamily="34" charset="0"/>
                 <a:cs typeface="Calibri" panose="020F0502020204030204" pitchFamily="34" charset="0"/>
               </a:rPr>
-              <a:t>We are reading through these. We’ll have time to respond and incorporate these in soon.</a:t>
+              <a:t>We are reading through these. We’ll have time to respond and incorporate them in soon.</a:t>
             </a:r>
           </a:p>
           <a:p>
@@ -34718,6 +35039,90 @@
           </a:p>
         </p:txBody>
       </p:sp>
+      <p:pic>
+        <p:nvPicPr>
+          <p:cNvPr id="6" name="Picture 5" descr="Graphical user interface, text, application, email&#10;&#10;Description automatically generated">
+            <a:extLst>
+              <a:ext uri="{FF2B5EF4-FFF2-40B4-BE49-F238E27FC236}">
+                <a16:creationId xmlns:a16="http://schemas.microsoft.com/office/drawing/2014/main" id="{4600B169-160A-310C-2C85-86D80D67CCFD}"/>
+              </a:ext>
+            </a:extLst>
+          </p:cNvPr>
+          <p:cNvPicPr>
+            <a:picLocks noChangeAspect="1"/>
+          </p:cNvPicPr>
+          <p:nvPr/>
+        </p:nvPicPr>
+        <p:blipFill>
+          <a:blip r:embed="rId3">
+            <a:extLst>
+              <a:ext uri="{28A0092B-C50C-407E-A947-70E740481C1C}">
+                <a14:useLocalDpi xmlns:a14="http://schemas.microsoft.com/office/drawing/2010/main" val="0"/>
+              </a:ext>
+            </a:extLst>
+          </a:blip>
+          <a:stretch>
+            <a:fillRect/>
+          </a:stretch>
+        </p:blipFill>
+        <p:spPr>
+          <a:xfrm>
+            <a:off x="3773369" y="2643826"/>
+            <a:ext cx="7772400" cy="2187010"/>
+          </a:xfrm>
+          <a:prstGeom prst="rect">
+            <a:avLst/>
+          </a:prstGeom>
+          <a:ln>
+            <a:noFill/>
+          </a:ln>
+          <a:effectLst>
+            <a:softEdge rad="112500"/>
+          </a:effectLst>
+        </p:spPr>
+      </p:pic>
+      <p:pic>
+        <p:nvPicPr>
+          <p:cNvPr id="8" name="Picture 7" descr="Graphical user interface, text, application, website&#10;&#10;Description automatically generated">
+            <a:extLst>
+              <a:ext uri="{FF2B5EF4-FFF2-40B4-BE49-F238E27FC236}">
+                <a16:creationId xmlns:a16="http://schemas.microsoft.com/office/drawing/2014/main" id="{634AC4CE-4621-D810-6956-5A0B18BE44CD}"/>
+              </a:ext>
+            </a:extLst>
+          </p:cNvPr>
+          <p:cNvPicPr>
+            <a:picLocks noChangeAspect="1"/>
+          </p:cNvPicPr>
+          <p:nvPr/>
+        </p:nvPicPr>
+        <p:blipFill>
+          <a:blip r:embed="rId4">
+            <a:extLst>
+              <a:ext uri="{28A0092B-C50C-407E-A947-70E740481C1C}">
+                <a14:useLocalDpi xmlns:a14="http://schemas.microsoft.com/office/drawing/2010/main" val="0"/>
+              </a:ext>
+            </a:extLst>
+          </a:blip>
+          <a:stretch>
+            <a:fillRect/>
+          </a:stretch>
+        </p:blipFill>
+        <p:spPr>
+          <a:xfrm>
+            <a:off x="851634" y="5409880"/>
+            <a:ext cx="4892584" cy="931921"/>
+          </a:xfrm>
+          <a:prstGeom prst="rect">
+            <a:avLst/>
+          </a:prstGeom>
+          <a:ln>
+            <a:noFill/>
+          </a:ln>
+          <a:effectLst>
+            <a:softEdge rad="112500"/>
+          </a:effectLst>
+        </p:spPr>
+      </p:pic>
     </p:spTree>
     <p:extLst>
       <p:ext uri="{BB962C8B-B14F-4D97-AF65-F5344CB8AC3E}">
@@ -34974,7 +35379,7 @@
         <p:spPr>
           <a:xfrm>
             <a:off x="355477" y="816645"/>
-            <a:ext cx="11514400" cy="1508105"/>
+            <a:ext cx="11514400" cy="2062103"/>
           </a:xfrm>
           <a:prstGeom prst="rect">
             <a:avLst/>
@@ -34986,6 +35391,19 @@
             <a:spAutoFit/>
           </a:bodyPr>
           <a:lstStyle/>
+          <a:p>
+            <a:pPr marL="457189" indent="-457189">
+              <a:buFont typeface="Arial" panose="020B0604020202020204" pitchFamily="34" charset="0"/>
+              <a:buChar char="•"/>
+            </a:pPr>
+            <a:r>
+              <a:rPr lang="en-CH" sz="3200" dirty="0">
+                <a:latin typeface="Calibri" panose="020F0502020204030204" pitchFamily="34" charset="0"/>
+                <a:cs typeface="Calibri" panose="020F0502020204030204" pitchFamily="34" charset="0"/>
+              </a:rPr>
+              <a:t>Some mishaps mean it was not ready on time.</a:t>
+            </a:r>
+          </a:p>
           <a:p>
             <a:pPr marL="457189" indent="-457189">
               <a:buFont typeface="Arial" panose="020B0604020202020204" pitchFamily="34" charset="0"/>
@@ -35009,13 +35427,13 @@
               <a:buChar char="•"/>
             </a:pPr>
             <a:r>
-              <a:rPr lang="en-CH" sz="2800" dirty="0">
+              <a:rPr lang="en-CH" sz="3200" dirty="0">
                 <a:latin typeface="Calibri" panose="020F0502020204030204" pitchFamily="34" charset="0"/>
                 <a:cs typeface="Calibri" panose="020F0502020204030204" pitchFamily="34" charset="0"/>
               </a:rPr>
               <a:t>We’re moving as fast as possible!</a:t>
             </a:r>
-            <a:endParaRPr lang="en-CH" sz="3200" dirty="0">
+            <a:endParaRPr lang="en-CH" sz="3600" dirty="0">
               <a:latin typeface="Calibri" panose="020F0502020204030204" pitchFamily="34" charset="0"/>
               <a:cs typeface="Calibri" panose="020F0502020204030204" pitchFamily="34" charset="0"/>
             </a:endParaRPr>
@@ -35118,6 +35536,55 @@
                                           <p:spTgt spid="4">
                                             <p:txEl>
                                               <p:pRg st="1" end="1"/>
+                                            </p:txEl>
+                                          </p:spTgt>
+                                        </p:tgtEl>
+                                        <p:attrNameLst>
+                                          <p:attrName>style.visibility</p:attrName>
+                                        </p:attrNameLst>
+                                      </p:cBhvr>
+                                      <p:to>
+                                        <p:strVal val="visible"/>
+                                      </p:to>
+                                    </p:set>
+                                  </p:childTnLst>
+                                </p:cTn>
+                              </p:par>
+                            </p:childTnLst>
+                          </p:cTn>
+                        </p:par>
+                      </p:childTnLst>
+                    </p:cTn>
+                  </p:par>
+                  <p:par>
+                    <p:cTn id="11" fill="hold">
+                      <p:stCondLst>
+                        <p:cond delay="indefinite"/>
+                      </p:stCondLst>
+                      <p:childTnLst>
+                        <p:par>
+                          <p:cTn id="12" fill="hold">
+                            <p:stCondLst>
+                              <p:cond delay="0"/>
+                            </p:stCondLst>
+                            <p:childTnLst>
+                              <p:par>
+                                <p:cTn id="13" presetID="1" presetClass="entr" presetSubtype="0" fill="hold" grpId="0" nodeType="clickEffect">
+                                  <p:stCondLst>
+                                    <p:cond delay="0"/>
+                                  </p:stCondLst>
+                                  <p:childTnLst>
+                                    <p:set>
+                                      <p:cBhvr>
+                                        <p:cTn id="14" dur="1" fill="hold">
+                                          <p:stCondLst>
+                                            <p:cond delay="0"/>
+                                          </p:stCondLst>
+                                        </p:cTn>
+                                        <p:tgtEl>
+                                          <p:spTgt spid="4">
+                                            <p:txEl>
+                                              <p:pRg st="2" end="2"/>
                                             </p:txEl>
                                           </p:spTgt>
                                         </p:tgtEl>
@@ -35772,8 +36239,8 @@
         </p:nvSpPr>
         <p:spPr>
           <a:xfrm>
-            <a:off x="479419" y="4992980"/>
-            <a:ext cx="11514400" cy="954107"/>
+            <a:off x="479419" y="4906358"/>
+            <a:ext cx="11514400" cy="1384995"/>
           </a:xfrm>
           <a:prstGeom prst="rect">
             <a:avLst/>
@@ -35795,7 +36262,20 @@
                 <a:latin typeface="Calibri" panose="020F0502020204030204" pitchFamily="34" charset="0"/>
                 <a:cs typeface="Calibri" panose="020F0502020204030204" pitchFamily="34" charset="0"/>
               </a:rPr>
-              <a:t>May need to double the time you spend on the self-paced learning. Recommend two evenings per week. (6 hours total)</a:t>
+              <a:t>You may need to double the time you spend on self-paced learning. We recommend two evenings per week (6 hours total)</a:t>
+            </a:r>
+          </a:p>
+          <a:p>
+            <a:pPr marL="457189" indent="-457189">
+              <a:buFont typeface="Arial" panose="020B0604020202020204" pitchFamily="34" charset="0"/>
+              <a:buChar char="•"/>
+            </a:pPr>
+            <a:r>
+              <a:rPr lang="en-CH" sz="2800" dirty="0">
+                <a:latin typeface="Calibri" panose="020F0502020204030204" pitchFamily="34" charset="0"/>
+                <a:cs typeface="Calibri" panose="020F0502020204030204" pitchFamily="34" charset="0"/>
+              </a:rPr>
+              <a:t>New material will go up tomorrow around noon UTC+2</a:t>
             </a:r>
           </a:p>
         </p:txBody>
@@ -36002,6 +36482,55 @@
                       </p:childTnLst>
                     </p:cTn>
                   </p:par>
+                  <p:par>
+                    <p:cTn id="19" fill="hold">
+                      <p:stCondLst>
+                        <p:cond delay="indefinite"/>
+                      </p:stCondLst>
+                      <p:childTnLst>
+                        <p:par>
+                          <p:cTn id="20" fill="hold">
+                            <p:stCondLst>
+                              <p:cond delay="0"/>
+                            </p:stCondLst>
+                            <p:childTnLst>
+                              <p:par>
+                                <p:cTn id="21" presetID="1" presetClass="entr" presetSubtype="0" fill="hold" grpId="0" nodeType="clickEffect">
+                                  <p:stCondLst>
+                                    <p:cond delay="0"/>
+                                  </p:stCondLst>
+                                  <p:childTnLst>
+                                    <p:set>
+                                      <p:cBhvr>
+                                        <p:cTn id="22" dur="1" fill="hold">
+                                          <p:stCondLst>
+                                            <p:cond delay="0"/>
+                                          </p:stCondLst>
+                                        </p:cTn>
+                                        <p:tgtEl>
+                                          <p:spTgt spid="15">
+                                            <p:txEl>
+                                              <p:pRg st="1" end="1"/>
+                                            </p:txEl>
+                                          </p:spTgt>
+                                        </p:tgtEl>
+                                        <p:attrNameLst>
+                                          <p:attrName>style.visibility</p:attrName>
+                                        </p:attrNameLst>
+                                      </p:cBhvr>
+                                      <p:to>
+                                        <p:strVal val="visible"/>
+                                      </p:to>
+                                    </p:set>
+                                  </p:childTnLst>
+                                </p:cTn>
+                              </p:par>
+                            </p:childTnLst>
+                          </p:cTn>
+                        </p:par>
+                      </p:childTnLst>
+                    </p:cTn>
+                  </p:par>
                 </p:childTnLst>
               </p:cTn>
               <p:prevCondLst>
@@ -36141,7 +36670,7 @@
         </p:nvSpPr>
         <p:spPr>
           <a:xfrm>
-            <a:off x="479419" y="1034934"/>
+            <a:off x="479419" y="942336"/>
             <a:ext cx="11514400" cy="1384995"/>
           </a:xfrm>
           <a:prstGeom prst="rect">
@@ -36164,7 +36693,7 @@
                 <a:latin typeface="Calibri" panose="020F0502020204030204" pitchFamily="34" charset="0"/>
                 <a:cs typeface="Calibri" panose="020F0502020204030204" pitchFamily="34" charset="0"/>
               </a:rPr>
-              <a:t>If you haven’t submitted your work, please do asap.</a:t>
+              <a:t>If you haven’t submitted your work, please do so ASAP.</a:t>
             </a:r>
           </a:p>
           <a:p>
@@ -36448,7 +36977,7 @@
         </p:nvSpPr>
         <p:spPr>
           <a:xfrm>
-            <a:off x="479419" y="1034934"/>
+            <a:off x="479419" y="849739"/>
             <a:ext cx="11514400" cy="954107"/>
           </a:xfrm>
           <a:prstGeom prst="rect">
@@ -36646,7 +37175,7 @@
         <p:spPr>
           <a:xfrm>
             <a:off x="355478" y="128981"/>
-            <a:ext cx="3584636" cy="523220"/>
+            <a:ext cx="3712876" cy="523220"/>
           </a:xfrm>
           <a:prstGeom prst="rect">
             <a:avLst/>
@@ -36663,7 +37192,7 @@
               <a:rPr lang="en-US" sz="2800" b="1" dirty="0">
                 <a:latin typeface="Avenir Next" panose="020B0503020202020204" pitchFamily="34" charset="0"/>
               </a:rPr>
-              <a:t>Shrink your sidebar</a:t>
+              <a:t>Shrink your sidebar!</a:t>
             </a:r>
           </a:p>
         </p:txBody>
@@ -36682,7 +37211,7 @@
         </p:nvSpPr>
         <p:spPr>
           <a:xfrm>
-            <a:off x="479419" y="1034934"/>
+            <a:off x="479419" y="803441"/>
             <a:ext cx="11514400" cy="523220"/>
           </a:xfrm>
           <a:prstGeom prst="rect">
@@ -36701,16 +37230,12 @@
               <a:buChar char="•"/>
             </a:pPr>
             <a:r>
-              <a:rPr lang="en-CH" sz="2800">
+              <a:rPr lang="en-CH" sz="2800" dirty="0">
                 <a:latin typeface="Calibri" panose="020F0502020204030204" pitchFamily="34" charset="0"/>
                 <a:cs typeface="Calibri" panose="020F0502020204030204" pitchFamily="34" charset="0"/>
               </a:rPr>
-              <a:t>Onboarding tutorial coming soon</a:t>
+              <a:t>Platform tutorial coming soon</a:t>
             </a:r>
-            <a:endParaRPr lang="en-CH" sz="2800" dirty="0">
-              <a:latin typeface="Calibri" panose="020F0502020204030204" pitchFamily="34" charset="0"/>
-              <a:cs typeface="Calibri" panose="020F0502020204030204" pitchFamily="34" charset="0"/>
-            </a:endParaRPr>
           </a:p>
         </p:txBody>
       </p:sp>
@@ -36920,8 +37445,8 @@
         </p:nvSpPr>
         <p:spPr>
           <a:xfrm>
-            <a:off x="479419" y="1034934"/>
-            <a:ext cx="11514400" cy="1384995"/>
+            <a:off x="479419" y="884463"/>
+            <a:ext cx="11514400" cy="1815882"/>
           </a:xfrm>
           <a:prstGeom prst="rect">
             <a:avLst/>
@@ -36956,7 +37481,7 @@
                 <a:latin typeface="Calibri" panose="020F0502020204030204" pitchFamily="34" charset="0"/>
                 <a:cs typeface="Calibri" panose="020F0502020204030204" pitchFamily="34" charset="0"/>
               </a:rPr>
-              <a:t>Send each other connection requests</a:t>
+              <a:t>Send each other connection requests to enable messaging</a:t>
             </a:r>
           </a:p>
           <a:p>
@@ -36970,6 +37495,19 @@
                 <a:cs typeface="Calibri" panose="020F0502020204030204" pitchFamily="34" charset="0"/>
               </a:rPr>
               <a:t>Will soon incorporate real-time messaging.</a:t>
+            </a:r>
+          </a:p>
+          <a:p>
+            <a:pPr marL="457189" indent="-457189">
+              <a:buFont typeface="Arial" panose="020B0604020202020204" pitchFamily="34" charset="0"/>
+              <a:buChar char="•"/>
+            </a:pPr>
+            <a:r>
+              <a:rPr lang="en-CH" sz="2800" dirty="0">
+                <a:latin typeface="Calibri" panose="020F0502020204030204" pitchFamily="34" charset="0"/>
+                <a:cs typeface="Calibri" panose="020F0502020204030204" pitchFamily="34" charset="0"/>
+              </a:rPr>
+              <a:t>How to modify your notification preferences</a:t>
             </a:r>
           </a:p>
         </p:txBody>
@@ -37119,6 +37657,55 @@
                                           <p:spTgt spid="15">
                                             <p:txEl>
                                               <p:pRg st="2" end="2"/>
+                                            </p:txEl>
+                                          </p:spTgt>
+                                        </p:tgtEl>
+                                        <p:attrNameLst>
+                                          <p:attrName>style.visibility</p:attrName>
+                                        </p:attrNameLst>
+                                      </p:cBhvr>
+                                      <p:to>
+                                        <p:strVal val="visible"/>
+                                      </p:to>
+                                    </p:set>
+                                  </p:childTnLst>
+                                </p:cTn>
+                              </p:par>
+                            </p:childTnLst>
+                          </p:cTn>
+                        </p:par>
+                      </p:childTnLst>
+                    </p:cTn>
+                  </p:par>
+                  <p:par>
+                    <p:cTn id="15" fill="hold">
+                      <p:stCondLst>
+                        <p:cond delay="indefinite"/>
+                      </p:stCondLst>
+                      <p:childTnLst>
+                        <p:par>
+                          <p:cTn id="16" fill="hold">
+                            <p:stCondLst>
+                              <p:cond delay="0"/>
+                            </p:stCondLst>
+                            <p:childTnLst>
+                              <p:par>
+                                <p:cTn id="17" presetID="1" presetClass="entr" presetSubtype="0" fill="hold" grpId="0" nodeType="clickEffect">
+                                  <p:stCondLst>
+                                    <p:cond delay="0"/>
+                                  </p:stCondLst>
+                                  <p:childTnLst>
+                                    <p:set>
+                                      <p:cBhvr>
+                                        <p:cTn id="18" dur="1" fill="hold">
+                                          <p:stCondLst>
+                                            <p:cond delay="0"/>
+                                          </p:stCondLst>
+                                        </p:cTn>
+                                        <p:tgtEl>
+                                          <p:spTgt spid="15">
+                                            <p:txEl>
+                                              <p:pRg st="3" end="3"/>
                                             </p:txEl>
                                           </p:spTgt>
                                         </p:tgtEl>

</xml_diff>

<commit_message>
minor update on slides
</commit_message>
<xml_diff>
--- a/week_03/slides/rbp_workshop_03.pptx
+++ b/week_03/slides/rbp_workshop_03.pptx
@@ -34020,9 +34020,10 @@
               </a:spcBef>
             </a:pPr>
             <a:r>
-              <a:rPr lang="en" sz="3333" dirty="0"/>
-              <a:t>Workshop 01</a:t>
+              <a:rPr lang="en" sz="3333"/>
+              <a:t>Workshop 03</a:t>
             </a:r>
+            <a:endParaRPr lang="en" sz="3333" dirty="0"/>
           </a:p>
         </p:txBody>
       </p:sp>

</xml_diff>